<commit_message>
Shopping Tests simplification changes
</commit_message>
<xml_diff>
--- a/src/Files/4. Преработка и постепенни промени/04.04.Документиране-и-коментиране-на-кода.pptx
+++ b/src/Files/4. Преработка и постепенни промени/04.04.Документиране-и-коментиране-на-кода.pptx
@@ -332,7 +332,7 @@
             <a:fld id="{FE5B4EDC-59C0-49C7-8ADA-5A781B329E02}" type="datetimeFigureOut">
               <a:rPr lang="en-US"/>
               <a:pPr/>
-              <a:t>17-Dec-19</a:t>
+              <a:t>12/18/2023</a:t>
             </a:fld>
             <a:endParaRPr dirty="0"/>
           </a:p>
@@ -630,7 +630,7 @@
             <a:fld id="{F2D8D46A-B586-417D-BFBD-8C8FE0AAF762}" type="datetimeFigureOut">
               <a:rPr lang="en-US" smtClean="0"/>
               <a:pPr/>
-              <a:t>17-Dec-19</a:t>
+              <a:t>12/18/2023</a:t>
             </a:fld>
             <a:endParaRPr lang="en-US" dirty="0"/>
           </a:p>
@@ -16983,7 +16983,12 @@
             <p:ph idx="1"/>
           </p:nvPr>
         </p:nvSpPr>
-        <p:spPr/>
+        <p:spPr>
+          <a:xfrm>
+            <a:off x="195188" y="1151118"/>
+            <a:ext cx="11804822" cy="5570355"/>
+          </a:xfrm>
+        </p:spPr>
         <p:txBody>
           <a:bodyPr>
             <a:normAutofit/>
@@ -17050,12 +17055,8 @@
               <a:buAutoNum type="arabicPeriod"/>
             </a:pPr>
             <a:r>
-              <a:rPr lang="bg-BG" dirty="0" err="1"/>
-              <a:t>Самоописателен</a:t>
-            </a:r>
-            <a:r>
               <a:rPr lang="bg-BG" dirty="0"/>
-              <a:t> код</a:t>
+              <a:t>Самоописателен код</a:t>
             </a:r>
             <a:endParaRPr lang="en-US" dirty="0"/>
           </a:p>

</xml_diff>